<commit_message>
updated presentation. added more deployment scenarios and final page
</commit_message>
<xml_diff>
--- a/doc/TeleScope.pptx
+++ b/doc/TeleScope.pptx
@@ -34,6 +34,8 @@
     <p:sldId id="281" r:id="rId28"/>
     <p:sldId id="284" r:id="rId29"/>
     <p:sldId id="285" r:id="rId30"/>
+    <p:sldId id="286" r:id="rId31"/>
+    <p:sldId id="287" r:id="rId32"/>
   </p:sldIdLst>
   <p:sldSz cx="9144000" cy="6858000" type="screen4x3"/>
   <p:notesSz cx="6858000" cy="9144000"/>
@@ -169,7 +171,7 @@
           <a:p>
             <a:fld id="{4251665B-C24A-4702-B522-6A4334602E03}" type="datetimeFigureOut">
               <a:rPr lang="en-US" smtClean="0"/>
-              <a:t>6/1/14</a:t>
+              <a:t>6/3/14</a:t>
             </a:fld>
             <a:endParaRPr lang="en-US"/>
           </a:p>
@@ -926,7 +928,7 @@
           <a:p>
             <a:fld id="{4251665B-C24A-4702-B522-6A4334602E03}" type="datetimeFigureOut">
               <a:rPr lang="en-US" smtClean="0"/>
-              <a:t>6/1/14</a:t>
+              <a:t>6/3/14</a:t>
             </a:fld>
             <a:endParaRPr lang="en-US"/>
           </a:p>
@@ -1550,7 +1552,7 @@
           <a:p>
             <a:fld id="{4251665B-C24A-4702-B522-6A4334602E03}" type="datetimeFigureOut">
               <a:rPr lang="en-US" smtClean="0"/>
-              <a:t>6/1/14</a:t>
+              <a:t>6/3/14</a:t>
             </a:fld>
             <a:endParaRPr lang="en-US"/>
           </a:p>
@@ -1973,7 +1975,7 @@
           <a:p>
             <a:fld id="{4251665B-C24A-4702-B522-6A4334602E03}" type="datetimeFigureOut">
               <a:rPr lang="en-US" smtClean="0"/>
-              <a:t>6/1/14</a:t>
+              <a:t>6/3/14</a:t>
             </a:fld>
             <a:endParaRPr lang="en-US"/>
           </a:p>
@@ -2150,7 +2152,7 @@
           <a:p>
             <a:fld id="{4251665B-C24A-4702-B522-6A4334602E03}" type="datetimeFigureOut">
               <a:rPr lang="en-US" smtClean="0"/>
-              <a:t>6/1/14</a:t>
+              <a:t>6/3/14</a:t>
             </a:fld>
             <a:endParaRPr lang="en-US"/>
           </a:p>
@@ -2967,7 +2969,7 @@
           <a:p>
             <a:fld id="{4251665B-C24A-4702-B522-6A4334602E03}" type="datetimeFigureOut">
               <a:rPr lang="en-US" smtClean="0"/>
-              <a:t>6/1/14</a:t>
+              <a:t>6/3/14</a:t>
             </a:fld>
             <a:endParaRPr lang="en-US"/>
           </a:p>
@@ -3478,7 +3480,7 @@
           <a:p>
             <a:fld id="{4251665B-C24A-4702-B522-6A4334602E03}" type="datetimeFigureOut">
               <a:rPr lang="en-US" smtClean="0"/>
-              <a:t>6/1/14</a:t>
+              <a:t>6/3/14</a:t>
             </a:fld>
             <a:endParaRPr lang="en-US"/>
           </a:p>
@@ -3711,7 +3713,7 @@
           <a:p>
             <a:fld id="{4251665B-C24A-4702-B522-6A4334602E03}" type="datetimeFigureOut">
               <a:rPr lang="en-US" smtClean="0"/>
-              <a:t>6/1/14</a:t>
+              <a:t>6/3/14</a:t>
             </a:fld>
             <a:endParaRPr lang="en-US"/>
           </a:p>
@@ -4236,7 +4238,7 @@
           <a:p>
             <a:fld id="{4251665B-C24A-4702-B522-6A4334602E03}" type="datetimeFigureOut">
               <a:rPr lang="en-US" smtClean="0"/>
-              <a:t>6/1/14</a:t>
+              <a:t>6/3/14</a:t>
             </a:fld>
             <a:endParaRPr lang="en-US"/>
           </a:p>
@@ -4371,7 +4373,7 @@
           <a:p>
             <a:fld id="{4251665B-C24A-4702-B522-6A4334602E03}" type="datetimeFigureOut">
               <a:rPr lang="en-US" smtClean="0"/>
-              <a:t>6/1/14</a:t>
+              <a:t>6/3/14</a:t>
             </a:fld>
             <a:endParaRPr lang="en-US"/>
           </a:p>
@@ -5269,7 +5271,7 @@
           <a:p>
             <a:fld id="{4251665B-C24A-4702-B522-6A4334602E03}" type="datetimeFigureOut">
               <a:rPr lang="en-US" smtClean="0"/>
-              <a:t>6/1/14</a:t>
+              <a:t>6/3/14</a:t>
             </a:fld>
             <a:endParaRPr lang="en-US"/>
           </a:p>
@@ -5392,7 +5394,7 @@
           <a:p>
             <a:fld id="{4251665B-C24A-4702-B522-6A4334602E03}" type="datetimeFigureOut">
               <a:rPr lang="en-US" smtClean="0"/>
-              <a:t>6/1/14</a:t>
+              <a:t>6/3/14</a:t>
             </a:fld>
             <a:endParaRPr lang="en-US"/>
           </a:p>
@@ -6276,7 +6278,7 @@
           <a:p>
             <a:fld id="{4251665B-C24A-4702-B522-6A4334602E03}" type="datetimeFigureOut">
               <a:rPr lang="en-US" smtClean="0"/>
-              <a:t>6/1/14</a:t>
+              <a:t>6/3/14</a:t>
             </a:fld>
             <a:endParaRPr lang="en-US"/>
           </a:p>
@@ -6924,7 +6926,7 @@
           <a:p>
             <a:fld id="{4251665B-C24A-4702-B522-6A4334602E03}" type="datetimeFigureOut">
               <a:rPr lang="en-US" smtClean="0"/>
-              <a:t>6/1/14</a:t>
+              <a:t>6/3/14</a:t>
             </a:fld>
             <a:endParaRPr lang="en-US"/>
           </a:p>
@@ -7240,7 +7242,7 @@
           <a:p>
             <a:fld id="{4251665B-C24A-4702-B522-6A4334602E03}" type="datetimeFigureOut">
               <a:rPr lang="en-US" smtClean="0"/>
-              <a:t>6/1/14</a:t>
+              <a:t>6/3/14</a:t>
             </a:fld>
             <a:endParaRPr lang="en-US"/>
           </a:p>
@@ -7330,7 +7332,7 @@
           <a:p>
             <a:fld id="{4251665B-C24A-4702-B522-6A4334602E03}" type="datetimeFigureOut">
               <a:rPr lang="en-US" smtClean="0"/>
-              <a:t>6/1/14</a:t>
+              <a:t>6/3/14</a:t>
             </a:fld>
             <a:endParaRPr lang="en-US"/>
           </a:p>
@@ -7658,7 +7660,7 @@
           <a:p>
             <a:fld id="{4251665B-C24A-4702-B522-6A4334602E03}" type="datetimeFigureOut">
               <a:rPr lang="en-US" smtClean="0"/>
-              <a:t>6/1/14</a:t>
+              <a:t>6/3/14</a:t>
             </a:fld>
             <a:endParaRPr lang="en-US"/>
           </a:p>
@@ -8185,20 +8187,12 @@
               <a:rPr lang="en-US" dirty="0" smtClean="0"/>
               <a:t> </a:t>
             </a:r>
-            <a:r>
-              <a:rPr lang="en-US" dirty="0" smtClean="0"/>
-              <a:t/>
-            </a:r>
             <a:br>
               <a:rPr lang="en-US" dirty="0" smtClean="0"/>
             </a:br>
             <a:r>
               <a:rPr lang="en-US" sz="3100" dirty="0" smtClean="0"/>
-              <a:t>XML Stream/Replicator </a:t>
-            </a:r>
-            <a:r>
-              <a:rPr lang="en-US" sz="3100" dirty="0" smtClean="0"/>
-              <a:t>Platform</a:t>
+              <a:t>XML Stream/Replicator Platform</a:t>
             </a:r>
             <a:endParaRPr lang="en-US" dirty="0"/>
           </a:p>
@@ -8295,11 +8289,7 @@
             </a:r>
             <a:r>
               <a:rPr lang="en-US" sz="2000" dirty="0" smtClean="0"/>
-              <a:t>Collins, CO, </a:t>
-            </a:r>
-            <a:r>
-              <a:rPr lang="en-US" sz="2000" dirty="0" smtClean="0"/>
-              <a:t>USA</a:t>
+              <a:t>Collins, CO, USA</a:t>
             </a:r>
           </a:p>
           <a:p>
@@ -9234,11 +9224,7 @@
             </a:r>
             <a:r>
               <a:rPr lang="en-US" dirty="0" smtClean="0"/>
-              <a:t> </a:t>
-            </a:r>
-            <a:r>
-              <a:rPr lang="en-US" dirty="0" smtClean="0"/>
-              <a:t>Features</a:t>
+              <a:t> Features</a:t>
             </a:r>
             <a:endParaRPr lang="en-US" dirty="0"/>
           </a:p>
@@ -9396,11 +9382,7 @@
             </a:r>
             <a:r>
               <a:rPr lang="en-US" dirty="0" smtClean="0"/>
-              <a:t> </a:t>
-            </a:r>
-            <a:r>
-              <a:rPr lang="en-US" dirty="0" smtClean="0"/>
-              <a:t>Features</a:t>
+              <a:t> Features</a:t>
             </a:r>
             <a:endParaRPr lang="en-US" dirty="0"/>
           </a:p>
@@ -9544,11 +9526,7 @@
             </a:r>
             <a:r>
               <a:rPr lang="en-US" dirty="0" smtClean="0"/>
-              <a:t> </a:t>
-            </a:r>
-            <a:r>
-              <a:rPr lang="en-US" dirty="0" smtClean="0"/>
-              <a:t>Features</a:t>
+              <a:t> Features</a:t>
             </a:r>
             <a:endParaRPr lang="en-US" dirty="0"/>
           </a:p>
@@ -9691,11 +9669,7 @@
             </a:r>
             <a:r>
               <a:rPr lang="en-US" dirty="0" smtClean="0"/>
-              <a:t> </a:t>
-            </a:r>
-            <a:r>
-              <a:rPr lang="en-US" dirty="0" smtClean="0"/>
-              <a:t>Features</a:t>
+              <a:t> Features</a:t>
             </a:r>
             <a:endParaRPr lang="en-US" dirty="0"/>
           </a:p>
@@ -12137,11 +12111,7 @@
             </a:r>
             <a:r>
               <a:rPr lang="en-US" dirty="0" smtClean="0"/>
-              <a:t> </a:t>
-            </a:r>
-            <a:r>
-              <a:rPr lang="en-US" dirty="0" smtClean="0"/>
-              <a:t>Architecture</a:t>
+              <a:t> Architecture</a:t>
             </a:r>
             <a:endParaRPr lang="en-US" dirty="0"/>
           </a:p>
@@ -12173,11 +12143,7 @@
             </a:r>
             <a:r>
               <a:rPr lang="en-US" dirty="0" smtClean="0"/>
-              <a:t> </a:t>
-            </a:r>
-            <a:r>
-              <a:rPr lang="en-US" dirty="0" smtClean="0"/>
-              <a:t>is a complex </a:t>
+              <a:t> is a complex </a:t>
             </a:r>
             <a:r>
               <a:rPr lang="en-US" dirty="0"/>
@@ -12313,11 +12279,7 @@
             </a:r>
             <a:r>
               <a:rPr lang="en-US" dirty="0" smtClean="0"/>
-              <a:t> </a:t>
-            </a:r>
-            <a:r>
-              <a:rPr lang="en-US" dirty="0" smtClean="0"/>
-              <a:t>Architecture</a:t>
+              <a:t> Architecture</a:t>
             </a:r>
             <a:endParaRPr lang="en-US" dirty="0"/>
           </a:p>
@@ -12358,19 +12320,7 @@
             </a:r>
             <a:r>
               <a:rPr lang="en-US" dirty="0" smtClean="0"/>
-              <a:t>for access to the </a:t>
-            </a:r>
-            <a:r>
-              <a:rPr lang="en-US" dirty="0" smtClean="0"/>
-              <a:t>broker</a:t>
-            </a:r>
-            <a:r>
-              <a:rPr lang="en-US" dirty="0" smtClean="0"/>
-              <a:t> </a:t>
-            </a:r>
-            <a:r>
-              <a:rPr lang="en-US" dirty="0" smtClean="0"/>
-              <a:t>across the network using password authentication</a:t>
+              <a:t>for access to the broker across the network using password authentication</a:t>
             </a:r>
           </a:p>
           <a:p>
@@ -12440,11 +12390,7 @@
             </a:r>
             <a:r>
               <a:rPr lang="en-US" dirty="0" smtClean="0"/>
-              <a:t> </a:t>
-            </a:r>
-            <a:r>
-              <a:rPr lang="en-US" dirty="0" smtClean="0"/>
-              <a:t>Architecture</a:t>
+              <a:t> Architecture</a:t>
             </a:r>
             <a:endParaRPr lang="en-US" dirty="0"/>
           </a:p>
@@ -12640,11 +12586,7 @@
             </a:r>
             <a:r>
               <a:rPr lang="en-US" dirty="0" smtClean="0"/>
-              <a:t> </a:t>
-            </a:r>
-            <a:r>
-              <a:rPr lang="en-US" dirty="0" smtClean="0"/>
-              <a:t>distributed content filtering</a:t>
+              <a:t> distributed content filtering</a:t>
             </a:r>
             <a:endParaRPr lang="en-US" dirty="0"/>
           </a:p>
@@ -12739,11 +12681,7 @@
             </a:r>
             <a:r>
               <a:rPr lang="en-US" dirty="0" smtClean="0"/>
-              <a:t> </a:t>
-            </a:r>
-            <a:r>
-              <a:rPr lang="en-US" dirty="0" smtClean="0"/>
-              <a:t>content mesh topology</a:t>
+              <a:t> content mesh topology</a:t>
             </a:r>
             <a:endParaRPr lang="en-US" dirty="0"/>
           </a:p>
@@ -12869,7 +12807,7 @@
       </p:sp>
       <p:pic>
         <p:nvPicPr>
-          <p:cNvPr id="4" name="Picture 3" descr="telescope-deployment-arch.png"/>
+          <p:cNvPr id="5" name="Picture 4" descr="telescope-deployment-arch.png"/>
           <p:cNvPicPr>
             <a:picLocks noChangeAspect="1"/>
           </p:cNvPicPr>
@@ -12889,7 +12827,7 @@
         </p:blipFill>
         <p:spPr>
           <a:xfrm>
-            <a:off x="1136989" y="1685795"/>
+            <a:off x="1136989" y="1773820"/>
             <a:ext cx="6870023" cy="4856009"/>
           </a:xfrm>
           <a:prstGeom prst="rect">
@@ -13224,6 +13162,281 @@
     <p:extLst>
       <p:ext uri="{BB962C8B-B14F-4D97-AF65-F5344CB8AC3E}">
         <p14:creationId xmlns:p14="http://schemas.microsoft.com/office/powerpoint/2010/main" val="1388264124"/>
+      </p:ext>
+    </p:extLst>
+  </p:cSld>
+  <p:clrMapOvr>
+    <a:masterClrMapping/>
+  </p:clrMapOvr>
+  <p:timing>
+    <p:tnLst>
+      <p:par>
+        <p:cTn xmlns:p14="http://schemas.microsoft.com/office/powerpoint/2010/main" id="1" dur="indefinite" restart="never" nodeType="tmRoot"/>
+      </p:par>
+    </p:tnLst>
+  </p:timing>
+</p:sld>
+</file>
+
+<file path=ppt/slides/slide30.xml><?xml version="1.0" encoding="utf-8"?>
+<p:sld xmlns:a="http://schemas.openxmlformats.org/drawingml/2006/main" xmlns:r="http://schemas.openxmlformats.org/officeDocument/2006/relationships" xmlns:p="http://schemas.openxmlformats.org/presentationml/2006/main">
+  <p:cSld>
+    <p:spTree>
+      <p:nvGrpSpPr>
+        <p:cNvPr id="1" name=""/>
+        <p:cNvGrpSpPr/>
+        <p:nvPr/>
+      </p:nvGrpSpPr>
+      <p:grpSpPr>
+        <a:xfrm>
+          <a:off x="0" y="0"/>
+          <a:ext cx="0" cy="0"/>
+          <a:chOff x="0" y="0"/>
+          <a:chExt cx="0" cy="0"/>
+        </a:xfrm>
+      </p:grpSpPr>
+      <p:sp>
+        <p:nvSpPr>
+          <p:cNvPr id="2" name="Title 1"/>
+          <p:cNvSpPr>
+            <a:spLocks noGrp="1"/>
+          </p:cNvSpPr>
+          <p:nvPr>
+            <p:ph type="title"/>
+          </p:nvPr>
+        </p:nvSpPr>
+        <p:spPr/>
+        <p:txBody>
+          <a:bodyPr>
+            <a:normAutofit/>
+          </a:bodyPr>
+          <a:lstStyle/>
+          <a:p>
+            <a:pPr algn="ctr"/>
+            <a:r>
+              <a:rPr lang="en-US" dirty="0" smtClean="0"/>
+              <a:t>Deployment Scenarios</a:t>
+            </a:r>
+            <a:endParaRPr lang="en-US" dirty="0"/>
+          </a:p>
+        </p:txBody>
+      </p:sp>
+      <p:sp>
+        <p:nvSpPr>
+          <p:cNvPr id="3" name="Content Placeholder 2"/>
+          <p:cNvSpPr>
+            <a:spLocks noGrp="1"/>
+          </p:cNvSpPr>
+          <p:nvPr>
+            <p:ph idx="1"/>
+          </p:nvPr>
+        </p:nvSpPr>
+        <p:spPr/>
+        <p:txBody>
+          <a:bodyPr/>
+          <a:lstStyle/>
+          <a:p>
+            <a:endParaRPr lang="en-US" dirty="0" smtClean="0"/>
+          </a:p>
+          <a:p>
+            <a:pPr marL="0" indent="0">
+              <a:buNone/>
+            </a:pPr>
+            <a:endParaRPr lang="en-US" dirty="0" smtClean="0"/>
+          </a:p>
+        </p:txBody>
+      </p:sp>
+      <p:pic>
+        <p:nvPicPr>
+          <p:cNvPr id="5" name="Picture 4" descr="telescope-deployment-arch-2.png"/>
+          <p:cNvPicPr>
+            <a:picLocks noChangeAspect="1"/>
+          </p:cNvPicPr>
+          <p:nvPr/>
+        </p:nvPicPr>
+        <p:blipFill>
+          <a:blip r:embed="rId2">
+            <a:extLst>
+              <a:ext uri="{28A0092B-C50C-407E-A947-70E740481C1C}">
+                <a14:useLocalDpi xmlns:a14="http://schemas.microsoft.com/office/drawing/2010/main" val="0"/>
+              </a:ext>
+            </a:extLst>
+          </a:blip>
+          <a:stretch>
+            <a:fillRect/>
+          </a:stretch>
+        </p:blipFill>
+        <p:spPr>
+          <a:xfrm>
+            <a:off x="1136989" y="1761245"/>
+            <a:ext cx="6870023" cy="4856009"/>
+          </a:xfrm>
+          <a:prstGeom prst="rect">
+            <a:avLst/>
+          </a:prstGeom>
+        </p:spPr>
+      </p:pic>
+    </p:spTree>
+    <p:extLst>
+      <p:ext uri="{BB962C8B-B14F-4D97-AF65-F5344CB8AC3E}">
+        <p14:creationId xmlns:p14="http://schemas.microsoft.com/office/powerpoint/2010/main" val="475181724"/>
+      </p:ext>
+    </p:extLst>
+  </p:cSld>
+  <p:clrMapOvr>
+    <a:masterClrMapping/>
+  </p:clrMapOvr>
+  <p:timing>
+    <p:tnLst>
+      <p:par>
+        <p:cTn xmlns:p14="http://schemas.microsoft.com/office/powerpoint/2010/main" id="1" dur="indefinite" restart="never" nodeType="tmRoot"/>
+      </p:par>
+    </p:tnLst>
+  </p:timing>
+</p:sld>
+</file>
+
+<file path=ppt/slides/slide31.xml><?xml version="1.0" encoding="utf-8"?>
+<p:sld xmlns:a="http://schemas.openxmlformats.org/drawingml/2006/main" xmlns:r="http://schemas.openxmlformats.org/officeDocument/2006/relationships" xmlns:p="http://schemas.openxmlformats.org/presentationml/2006/main">
+  <p:cSld>
+    <p:spTree>
+      <p:nvGrpSpPr>
+        <p:cNvPr id="1" name=""/>
+        <p:cNvGrpSpPr/>
+        <p:nvPr/>
+      </p:nvGrpSpPr>
+      <p:grpSpPr>
+        <a:xfrm>
+          <a:off x="0" y="0"/>
+          <a:ext cx="0" cy="0"/>
+          <a:chOff x="0" y="0"/>
+          <a:chExt cx="0" cy="0"/>
+        </a:xfrm>
+      </p:grpSpPr>
+      <p:sp>
+        <p:nvSpPr>
+          <p:cNvPr id="2" name="Title 1"/>
+          <p:cNvSpPr>
+            <a:spLocks noGrp="1"/>
+          </p:cNvSpPr>
+          <p:nvPr>
+            <p:ph type="title"/>
+          </p:nvPr>
+        </p:nvSpPr>
+        <p:spPr/>
+        <p:txBody>
+          <a:bodyPr>
+            <a:normAutofit/>
+          </a:bodyPr>
+          <a:lstStyle/>
+          <a:p>
+            <a:pPr algn="ctr"/>
+            <a:r>
+              <a:rPr lang="en-US" dirty="0" smtClean="0"/>
+              <a:t>Future Directions</a:t>
+            </a:r>
+            <a:endParaRPr lang="en-US" dirty="0"/>
+          </a:p>
+        </p:txBody>
+      </p:sp>
+      <p:sp>
+        <p:nvSpPr>
+          <p:cNvPr id="9" name="Content Placeholder 8"/>
+          <p:cNvSpPr>
+            <a:spLocks noGrp="1"/>
+          </p:cNvSpPr>
+          <p:nvPr>
+            <p:ph idx="1"/>
+          </p:nvPr>
+        </p:nvSpPr>
+        <p:spPr/>
+        <p:txBody>
+          <a:bodyPr/>
+          <a:lstStyle/>
+          <a:p>
+            <a:pPr marL="0" indent="0">
+              <a:buNone/>
+            </a:pPr>
+            <a:endParaRPr lang="en-US" dirty="0" smtClean="0"/>
+          </a:p>
+          <a:p>
+            <a:pPr marL="0" indent="0">
+              <a:buNone/>
+            </a:pPr>
+            <a:endParaRPr lang="en-US" dirty="0" smtClean="0"/>
+          </a:p>
+          <a:p>
+            <a:r>
+              <a:rPr lang="en-US" dirty="0" smtClean="0"/>
+              <a:t>Lots of things to improve and add new features as requirements mature</a:t>
+            </a:r>
+          </a:p>
+          <a:p>
+            <a:endParaRPr lang="en-US" dirty="0"/>
+          </a:p>
+          <a:p>
+            <a:endParaRPr lang="en-US" dirty="0"/>
+          </a:p>
+          <a:p>
+            <a:endParaRPr lang="en-US" dirty="0"/>
+          </a:p>
+          <a:p>
+            <a:endParaRPr lang="en-US" dirty="0"/>
+          </a:p>
+          <a:p>
+            <a:endParaRPr lang="en-US" dirty="0"/>
+          </a:p>
+          <a:p>
+            <a:endParaRPr lang="en-US" dirty="0"/>
+          </a:p>
+          <a:p>
+            <a:endParaRPr lang="en-US" dirty="0"/>
+          </a:p>
+          <a:p>
+            <a:endParaRPr lang="en-US" dirty="0"/>
+          </a:p>
+          <a:p>
+            <a:endParaRPr lang="en-US" dirty="0"/>
+          </a:p>
+          <a:p>
+            <a:endParaRPr lang="en-US" dirty="0"/>
+          </a:p>
+        </p:txBody>
+      </p:sp>
+      <p:pic>
+        <p:nvPicPr>
+          <p:cNvPr id="3" name="Picture 2" descr="telescope-logo3.png"/>
+          <p:cNvPicPr>
+            <a:picLocks noChangeAspect="1"/>
+          </p:cNvPicPr>
+          <p:nvPr/>
+        </p:nvPicPr>
+        <p:blipFill>
+          <a:blip r:embed="rId2">
+            <a:extLst>
+              <a:ext uri="{28A0092B-C50C-407E-A947-70E740481C1C}">
+                <a14:useLocalDpi xmlns:a14="http://schemas.microsoft.com/office/drawing/2010/main" val="0"/>
+              </a:ext>
+            </a:extLst>
+          </a:blip>
+          <a:stretch>
+            <a:fillRect/>
+          </a:stretch>
+        </p:blipFill>
+        <p:spPr>
+          <a:xfrm>
+            <a:off x="3577000" y="4567392"/>
+            <a:ext cx="1990001" cy="1406614"/>
+          </a:xfrm>
+          <a:prstGeom prst="rect">
+            <a:avLst/>
+          </a:prstGeom>
+        </p:spPr>
+      </p:pic>
+    </p:spTree>
+    <p:extLst>
+      <p:ext uri="{BB962C8B-B14F-4D97-AF65-F5344CB8AC3E}">
+        <p14:creationId xmlns:p14="http://schemas.microsoft.com/office/powerpoint/2010/main" val="1984323330"/>
       </p:ext>
     </p:extLst>
   </p:cSld>

</xml_diff>

<commit_message>
minor editing of the 1st page of the presentation, added PDF version of presentation
</commit_message>
<xml_diff>
--- a/doc/TeleScope.pptx
+++ b/doc/TeleScope.pptx
@@ -171,7 +171,7 @@
           <a:p>
             <a:fld id="{4251665B-C24A-4702-B522-6A4334602E03}" type="datetimeFigureOut">
               <a:rPr lang="en-US" smtClean="0"/>
-              <a:t>6/3/14</a:t>
+              <a:t>6/9/14</a:t>
             </a:fld>
             <a:endParaRPr lang="en-US"/>
           </a:p>
@@ -928,7 +928,7 @@
           <a:p>
             <a:fld id="{4251665B-C24A-4702-B522-6A4334602E03}" type="datetimeFigureOut">
               <a:rPr lang="en-US" smtClean="0"/>
-              <a:t>6/3/14</a:t>
+              <a:t>6/9/14</a:t>
             </a:fld>
             <a:endParaRPr lang="en-US"/>
           </a:p>
@@ -1552,7 +1552,7 @@
           <a:p>
             <a:fld id="{4251665B-C24A-4702-B522-6A4334602E03}" type="datetimeFigureOut">
               <a:rPr lang="en-US" smtClean="0"/>
-              <a:t>6/3/14</a:t>
+              <a:t>6/9/14</a:t>
             </a:fld>
             <a:endParaRPr lang="en-US"/>
           </a:p>
@@ -1975,7 +1975,7 @@
           <a:p>
             <a:fld id="{4251665B-C24A-4702-B522-6A4334602E03}" type="datetimeFigureOut">
               <a:rPr lang="en-US" smtClean="0"/>
-              <a:t>6/3/14</a:t>
+              <a:t>6/9/14</a:t>
             </a:fld>
             <a:endParaRPr lang="en-US"/>
           </a:p>
@@ -2152,7 +2152,7 @@
           <a:p>
             <a:fld id="{4251665B-C24A-4702-B522-6A4334602E03}" type="datetimeFigureOut">
               <a:rPr lang="en-US" smtClean="0"/>
-              <a:t>6/3/14</a:t>
+              <a:t>6/9/14</a:t>
             </a:fld>
             <a:endParaRPr lang="en-US"/>
           </a:p>
@@ -2969,7 +2969,7 @@
           <a:p>
             <a:fld id="{4251665B-C24A-4702-B522-6A4334602E03}" type="datetimeFigureOut">
               <a:rPr lang="en-US" smtClean="0"/>
-              <a:t>6/3/14</a:t>
+              <a:t>6/9/14</a:t>
             </a:fld>
             <a:endParaRPr lang="en-US"/>
           </a:p>
@@ -3480,7 +3480,7 @@
           <a:p>
             <a:fld id="{4251665B-C24A-4702-B522-6A4334602E03}" type="datetimeFigureOut">
               <a:rPr lang="en-US" smtClean="0"/>
-              <a:t>6/3/14</a:t>
+              <a:t>6/9/14</a:t>
             </a:fld>
             <a:endParaRPr lang="en-US"/>
           </a:p>
@@ -3713,7 +3713,7 @@
           <a:p>
             <a:fld id="{4251665B-C24A-4702-B522-6A4334602E03}" type="datetimeFigureOut">
               <a:rPr lang="en-US" smtClean="0"/>
-              <a:t>6/3/14</a:t>
+              <a:t>6/9/14</a:t>
             </a:fld>
             <a:endParaRPr lang="en-US"/>
           </a:p>
@@ -4238,7 +4238,7 @@
           <a:p>
             <a:fld id="{4251665B-C24A-4702-B522-6A4334602E03}" type="datetimeFigureOut">
               <a:rPr lang="en-US" smtClean="0"/>
-              <a:t>6/3/14</a:t>
+              <a:t>6/9/14</a:t>
             </a:fld>
             <a:endParaRPr lang="en-US"/>
           </a:p>
@@ -4373,7 +4373,7 @@
           <a:p>
             <a:fld id="{4251665B-C24A-4702-B522-6A4334602E03}" type="datetimeFigureOut">
               <a:rPr lang="en-US" smtClean="0"/>
-              <a:t>6/3/14</a:t>
+              <a:t>6/9/14</a:t>
             </a:fld>
             <a:endParaRPr lang="en-US"/>
           </a:p>
@@ -5271,7 +5271,7 @@
           <a:p>
             <a:fld id="{4251665B-C24A-4702-B522-6A4334602E03}" type="datetimeFigureOut">
               <a:rPr lang="en-US" smtClean="0"/>
-              <a:t>6/3/14</a:t>
+              <a:t>6/9/14</a:t>
             </a:fld>
             <a:endParaRPr lang="en-US"/>
           </a:p>
@@ -5394,7 +5394,7 @@
           <a:p>
             <a:fld id="{4251665B-C24A-4702-B522-6A4334602E03}" type="datetimeFigureOut">
               <a:rPr lang="en-US" smtClean="0"/>
-              <a:t>6/3/14</a:t>
+              <a:t>6/9/14</a:t>
             </a:fld>
             <a:endParaRPr lang="en-US"/>
           </a:p>
@@ -6278,7 +6278,7 @@
           <a:p>
             <a:fld id="{4251665B-C24A-4702-B522-6A4334602E03}" type="datetimeFigureOut">
               <a:rPr lang="en-US" smtClean="0"/>
-              <a:t>6/3/14</a:t>
+              <a:t>6/9/14</a:t>
             </a:fld>
             <a:endParaRPr lang="en-US"/>
           </a:p>
@@ -6926,7 +6926,7 @@
           <a:p>
             <a:fld id="{4251665B-C24A-4702-B522-6A4334602E03}" type="datetimeFigureOut">
               <a:rPr lang="en-US" smtClean="0"/>
-              <a:t>6/3/14</a:t>
+              <a:t>6/9/14</a:t>
             </a:fld>
             <a:endParaRPr lang="en-US"/>
           </a:p>
@@ -7242,7 +7242,7 @@
           <a:p>
             <a:fld id="{4251665B-C24A-4702-B522-6A4334602E03}" type="datetimeFigureOut">
               <a:rPr lang="en-US" smtClean="0"/>
-              <a:t>6/3/14</a:t>
+              <a:t>6/9/14</a:t>
             </a:fld>
             <a:endParaRPr lang="en-US"/>
           </a:p>
@@ -7332,7 +7332,7 @@
           <a:p>
             <a:fld id="{4251665B-C24A-4702-B522-6A4334602E03}" type="datetimeFigureOut">
               <a:rPr lang="en-US" smtClean="0"/>
-              <a:t>6/3/14</a:t>
+              <a:t>6/9/14</a:t>
             </a:fld>
             <a:endParaRPr lang="en-US"/>
           </a:p>
@@ -7660,7 +7660,7 @@
           <a:p>
             <a:fld id="{4251665B-C24A-4702-B522-6A4334602E03}" type="datetimeFigureOut">
               <a:rPr lang="en-US" smtClean="0"/>
-              <a:t>6/3/14</a:t>
+              <a:t>6/9/14</a:t>
             </a:fld>
             <a:endParaRPr lang="en-US"/>
           </a:p>
@@ -8192,7 +8192,11 @@
             </a:br>
             <a:r>
               <a:rPr lang="en-US" sz="3100" dirty="0" smtClean="0"/>
-              <a:t>XML Stream/Replicator Platform</a:t>
+              <a:t>XML Data Stream Broker/</a:t>
+            </a:r>
+            <a:r>
+              <a:rPr lang="en-US" sz="3100" dirty="0" smtClean="0"/>
+              <a:t>Replicator Platform</a:t>
             </a:r>
             <a:endParaRPr lang="en-US" dirty="0"/>
           </a:p>
@@ -8227,7 +8231,7 @@
         <p:spPr>
           <a:xfrm>
             <a:off x="1939245" y="2150274"/>
-            <a:ext cx="5114428" cy="3262432"/>
+            <a:ext cx="5114428" cy="2893100"/>
           </a:xfrm>
           <a:prstGeom prst="rect">
             <a:avLst/>
@@ -8310,10 +8314,7 @@
               <a:rPr lang="en-US" sz="1600" dirty="0" err="1" smtClean="0"/>
               <a:t>Baldoni</a:t>
             </a:r>
-            <a:r>
-              <a:rPr lang="en-US" sz="1600" dirty="0" smtClean="0"/>
-              <a:t> (2005)</a:t>
-            </a:r>
+            <a:endParaRPr lang="en-US" sz="1600" dirty="0" smtClean="0"/>
           </a:p>
           <a:p>
             <a:pPr algn="ctr"/>

</xml_diff>

<commit_message>
minor corrections on the 1st page of the presentation
</commit_message>
<xml_diff>
--- a/doc/TeleScope.pptx
+++ b/doc/TeleScope.pptx
@@ -8247,12 +8247,9 @@
             <a:pPr algn="ctr"/>
             <a:r>
               <a:rPr lang="en-US" sz="2400" dirty="0"/>
-              <a:t>Belyaev </a:t>
-            </a:r>
-            <a:r>
-              <a:rPr lang="en-US" sz="2400" dirty="0" smtClean="0"/>
-              <a:t>Kirill</a:t>
-            </a:r>
+              <a:t>Kirill Belyaev</a:t>
+            </a:r>
+            <a:endParaRPr lang="en-US" sz="2400" dirty="0" smtClean="0"/>
           </a:p>
           <a:p>
             <a:pPr algn="ctr"/>

</xml_diff>